<commit_message>
updated links and minor updates to presentation
</commit_message>
<xml_diff>
--- a/presentations/pptx/03-Using tidyverse.pptx
+++ b/presentations/pptx/03-Using tidyverse.pptx
@@ -220,7 +220,7 @@
           <a:p>
             <a:fld id="{5C93CA8F-50F8-44B5-B48F-4C4452AC4FCB}" type="datetimeFigureOut">
               <a:rPr lang="he-IL" smtClean="0"/>
-              <a:t>כ"ד/אדר ב/תשע"ט</a:t>
+              <a:t>ב'/אייר/תשע"ט</a:t>
             </a:fld>
             <a:endParaRPr lang="he-IL"/>
           </a:p>
@@ -893,7 +893,7 @@
           <a:p>
             <a:fld id="{808B8BE7-FA93-462E-91E9-54E26C408D98}" type="datetime6">
               <a:rPr lang="en-US" smtClean="0"/>
-              <a:t>March 19</a:t>
+              <a:t>May 19</a:t>
             </a:fld>
             <a:endParaRPr lang="en-US" dirty="0"/>
           </a:p>
@@ -1126,7 +1126,7 @@
           <a:p>
             <a:fld id="{0D82CCDA-FC2D-4BA5-90E3-739DC6ED4C30}" type="datetime6">
               <a:rPr lang="en-US" smtClean="0"/>
-              <a:t>March 19</a:t>
+              <a:t>May 19</a:t>
             </a:fld>
             <a:endParaRPr lang="en-US" dirty="0"/>
           </a:p>
@@ -1305,7 +1305,7 @@
           <a:p>
             <a:fld id="{8F88DA83-5073-4626-B6B8-E91A24F45A53}" type="datetime6">
               <a:rPr lang="en-US" smtClean="0"/>
-              <a:t>March 19</a:t>
+              <a:t>May 19</a:t>
             </a:fld>
             <a:endParaRPr lang="en-US" dirty="0"/>
           </a:p>
@@ -1474,7 +1474,7 @@
           <a:p>
             <a:fld id="{EEBDCC4F-2BAB-4EBD-BBEA-01B8D436681A}" type="datetime6">
               <a:rPr lang="en-US" smtClean="0"/>
-              <a:t>March 19</a:t>
+              <a:t>May 19</a:t>
             </a:fld>
             <a:endParaRPr lang="en-US" dirty="0"/>
           </a:p>
@@ -1798,7 +1798,7 @@
           <a:p>
             <a:fld id="{79487F88-0456-4CDE-8B89-4A78647F618A}" type="datetime6">
               <a:rPr lang="en-US" smtClean="0"/>
-              <a:t>March 19</a:t>
+              <a:t>May 19</a:t>
             </a:fld>
             <a:endParaRPr lang="en-US" dirty="0"/>
           </a:p>
@@ -2248,7 +2248,7 @@
           <a:p>
             <a:fld id="{9136D32D-E4FB-4AA6-8422-EE667E33FFC1}" type="datetime6">
               <a:rPr lang="en-US" smtClean="0"/>
-              <a:t>March 19</a:t>
+              <a:t>May 19</a:t>
             </a:fld>
             <a:endParaRPr lang="en-US" dirty="0"/>
           </a:p>
@@ -2681,7 +2681,7 @@
           <a:p>
             <a:fld id="{3AB3EC8A-F822-46B6-826B-CC266009A74B}" type="datetime6">
               <a:rPr lang="en-US" smtClean="0"/>
-              <a:t>March 19</a:t>
+              <a:t>May 19</a:t>
             </a:fld>
             <a:endParaRPr lang="en-US" dirty="0"/>
           </a:p>
@@ -2798,7 +2798,7 @@
           <a:p>
             <a:fld id="{514A54EB-9E75-485B-93FC-08837C33F6A9}" type="datetime6">
               <a:rPr lang="en-US" smtClean="0"/>
-              <a:t>March 19</a:t>
+              <a:t>May 19</a:t>
             </a:fld>
             <a:endParaRPr lang="en-US" dirty="0"/>
           </a:p>
@@ -2892,7 +2892,7 @@
           <a:p>
             <a:fld id="{4187F57E-3EB2-4425-B7C6-E80F41215C16}" type="datetime6">
               <a:rPr lang="en-US" smtClean="0"/>
-              <a:t>March 19</a:t>
+              <a:t>May 19</a:t>
             </a:fld>
             <a:endParaRPr lang="en-US" dirty="0"/>
           </a:p>
@@ -3241,7 +3241,7 @@
           <a:p>
             <a:fld id="{C0AA945B-18EE-4367-BA0C-8D19048BCABE}" type="datetime6">
               <a:rPr lang="en-US" smtClean="0"/>
-              <a:t>March 19</a:t>
+              <a:t>May 19</a:t>
             </a:fld>
             <a:endParaRPr lang="en-US" dirty="0"/>
           </a:p>
@@ -3729,7 +3729,7 @@
           <a:p>
             <a:fld id="{F5D71FBB-8CD4-4D0A-B8C4-65C60609C705}" type="datetime6">
               <a:rPr lang="en-US" smtClean="0"/>
-              <a:t>March 19</a:t>
+              <a:t>May 19</a:t>
             </a:fld>
             <a:endParaRPr lang="en-US" dirty="0"/>
           </a:p>
@@ -4061,7 +4061,7 @@
           <a:p>
             <a:fld id="{CB7DA022-A739-4269-87CF-EB9B0BE787C4}" type="datetime6">
               <a:rPr lang="en-US" smtClean="0"/>
-              <a:t>March 19</a:t>
+              <a:t>May 19</a:t>
             </a:fld>
             <a:endParaRPr lang="en-US" dirty="0"/>
           </a:p>
@@ -5589,7 +5589,7 @@
         <p:spPr>
           <a:xfrm>
             <a:off x="1239665" y="4490836"/>
-            <a:ext cx="6413935" cy="830997"/>
+            <a:ext cx="6042039" cy="830997"/>
           </a:xfrm>
           <a:prstGeom prst="rect">
             <a:avLst/>
@@ -5698,20 +5698,6 @@
               <a:t>")), </a:t>
             </a:r>
             <a:r>
-              <a:rPr lang="en-US" sz="1200" b="1" dirty="0">
-                <a:latin typeface="Courier New" panose="02070309020205020404" pitchFamily="49" charset="0"/>
-                <a:cs typeface="Courier New" panose="02070309020205020404" pitchFamily="49" charset="0"/>
-              </a:rPr>
-              <a:t>funs</a:t>
-            </a:r>
-            <a:r>
-              <a:rPr lang="en-US" sz="1200" dirty="0">
-                <a:latin typeface="Courier New" panose="02070309020205020404" pitchFamily="49" charset="0"/>
-                <a:cs typeface="Courier New" panose="02070309020205020404" pitchFamily="49" charset="0"/>
-              </a:rPr>
-              <a:t>(</a:t>
-            </a:r>
-            <a:r>
               <a:rPr lang="en-US" sz="1200" dirty="0" err="1">
                 <a:latin typeface="Courier New" panose="02070309020205020404" pitchFamily="49" charset="0"/>
                 <a:cs typeface="Courier New" panose="02070309020205020404" pitchFamily="49" charset="0"/>
@@ -5723,7 +5709,7 @@
                 <a:latin typeface="Courier New" panose="02070309020205020404" pitchFamily="49" charset="0"/>
                 <a:cs typeface="Courier New" panose="02070309020205020404" pitchFamily="49" charset="0"/>
               </a:rPr>
-              <a:t>))</a:t>
+              <a:t>)</a:t>
             </a:r>
             <a:endParaRPr lang="en-IL" sz="1200" dirty="0">
               <a:latin typeface="Courier New" panose="02070309020205020404" pitchFamily="49" charset="0"/>
@@ -5732,126 +5718,6 @@
           </a:p>
         </p:txBody>
       </p:sp>
-      <p:grpSp>
-        <p:nvGrpSpPr>
-          <p:cNvPr id="13" name="Group 12">
-            <a:extLst>
-              <a:ext uri="{FF2B5EF4-FFF2-40B4-BE49-F238E27FC236}">
-                <a16:creationId xmlns:a16="http://schemas.microsoft.com/office/drawing/2014/main" id="{A1322FC2-5744-4CE8-A5E2-FFEAAAF56F86}"/>
-              </a:ext>
-            </a:extLst>
-          </p:cNvPr>
-          <p:cNvGrpSpPr/>
-          <p:nvPr/>
-        </p:nvGrpSpPr>
-        <p:grpSpPr>
-          <a:xfrm>
-            <a:off x="5848540" y="5369667"/>
-            <a:ext cx="5656876" cy="923330"/>
-            <a:chOff x="5848540" y="5369667"/>
-            <a:chExt cx="5656876" cy="923330"/>
-          </a:xfrm>
-        </p:grpSpPr>
-        <p:cxnSp>
-          <p:nvCxnSpPr>
-            <p:cNvPr id="8" name="Connector: Elbow 7">
-              <a:extLst>
-                <a:ext uri="{FF2B5EF4-FFF2-40B4-BE49-F238E27FC236}">
-                  <a16:creationId xmlns:a16="http://schemas.microsoft.com/office/drawing/2014/main" id="{EC34B061-8377-498A-B6DB-E7E49AE8CE9E}"/>
-                </a:ext>
-              </a:extLst>
-            </p:cNvPr>
-            <p:cNvCxnSpPr>
-              <a:cxnSpLocks/>
-            </p:cNvCxnSpPr>
-            <p:nvPr/>
-          </p:nvCxnSpPr>
-          <p:spPr>
-            <a:xfrm rot="10800000">
-              <a:off x="5848540" y="5369667"/>
-              <a:ext cx="1407981" cy="442656"/>
-            </a:xfrm>
-            <a:prstGeom prst="bentConnector3">
-              <a:avLst>
-                <a:gd name="adj1" fmla="val 99512"/>
-              </a:avLst>
-            </a:prstGeom>
-            <a:ln>
-              <a:tailEnd type="triangle"/>
-            </a:ln>
-          </p:spPr>
-          <p:style>
-            <a:lnRef idx="1">
-              <a:schemeClr val="accent4"/>
-            </a:lnRef>
-            <a:fillRef idx="0">
-              <a:schemeClr val="accent4"/>
-            </a:fillRef>
-            <a:effectRef idx="0">
-              <a:schemeClr val="accent4"/>
-            </a:effectRef>
-            <a:fontRef idx="minor">
-              <a:schemeClr val="tx1"/>
-            </a:fontRef>
-          </p:style>
-        </p:cxnSp>
-        <p:sp>
-          <p:nvSpPr>
-            <p:cNvPr id="12" name="TextBox 11">
-              <a:extLst>
-                <a:ext uri="{FF2B5EF4-FFF2-40B4-BE49-F238E27FC236}">
-                  <a16:creationId xmlns:a16="http://schemas.microsoft.com/office/drawing/2014/main" id="{92038A35-EF92-40C3-8361-75CCFEF76D72}"/>
-                </a:ext>
-              </a:extLst>
-            </p:cNvPr>
-            <p:cNvSpPr txBox="1"/>
-            <p:nvPr/>
-          </p:nvSpPr>
-          <p:spPr>
-            <a:xfrm>
-              <a:off x="7415784" y="5369667"/>
-              <a:ext cx="4089632" cy="923330"/>
-            </a:xfrm>
-            <a:prstGeom prst="rect">
-              <a:avLst/>
-            </a:prstGeom>
-            <a:noFill/>
-          </p:spPr>
-          <p:txBody>
-            <a:bodyPr wrap="square" rtlCol="0">
-              <a:spAutoFit/>
-            </a:bodyPr>
-            <a:lstStyle/>
-            <a:p>
-              <a:r>
-                <a:rPr lang="en-US" i="1" dirty="0"/>
-                <a:t>funs</a:t>
-              </a:r>
-              <a:r>
-                <a:rPr lang="en-US" dirty="0"/>
-                <a:t> lets </a:t>
-              </a:r>
-              <a:r>
-                <a:rPr lang="en-US" i="1" dirty="0" err="1"/>
-                <a:t>mutate_at</a:t>
-              </a:r>
-              <a:r>
-                <a:rPr lang="en-US" dirty="0"/>
-                <a:t> know that we want it to treat </a:t>
-              </a:r>
-              <a:r>
-                <a:rPr lang="en-US" i="1" dirty="0" err="1"/>
-                <a:t>some_function</a:t>
-              </a:r>
-              <a:r>
-                <a:rPr lang="en-US" dirty="0"/>
-                <a:t> as a function</a:t>
-              </a:r>
-              <a:endParaRPr lang="en-IL" dirty="0"/>
-            </a:p>
-          </p:txBody>
-        </p:sp>
-      </p:grpSp>
     </p:spTree>
     <p:extLst>
       <p:ext uri="{BB962C8B-B14F-4D97-AF65-F5344CB8AC3E}">
@@ -5862,81 +5728,6 @@
   <p:clrMapOvr>
     <a:masterClrMapping/>
   </p:clrMapOvr>
-  <p:timing>
-    <p:tnLst>
-      <p:par>
-        <p:cTn id="1" dur="indefinite" restart="never" nodeType="tmRoot">
-          <p:childTnLst>
-            <p:seq concurrent="1" nextAc="seek">
-              <p:cTn id="2" dur="indefinite" nodeType="mainSeq">
-                <p:childTnLst>
-                  <p:par>
-                    <p:cTn id="3" fill="hold">
-                      <p:stCondLst>
-                        <p:cond delay="indefinite"/>
-                      </p:stCondLst>
-                      <p:childTnLst>
-                        <p:par>
-                          <p:cTn id="4" fill="hold">
-                            <p:stCondLst>
-                              <p:cond delay="0"/>
-                            </p:stCondLst>
-                            <p:childTnLst>
-                              <p:par>
-                                <p:cTn id="5" presetID="1" presetClass="entr" presetSubtype="0" fill="hold" nodeType="clickEffect">
-                                  <p:stCondLst>
-                                    <p:cond delay="0"/>
-                                  </p:stCondLst>
-                                  <p:childTnLst>
-                                    <p:set>
-                                      <p:cBhvr>
-                                        <p:cTn id="6" dur="1" fill="hold">
-                                          <p:stCondLst>
-                                            <p:cond delay="0"/>
-                                          </p:stCondLst>
-                                        </p:cTn>
-                                        <p:tgtEl>
-                                          <p:spTgt spid="13"/>
-                                        </p:tgtEl>
-                                        <p:attrNameLst>
-                                          <p:attrName>style.visibility</p:attrName>
-                                        </p:attrNameLst>
-                                      </p:cBhvr>
-                                      <p:to>
-                                        <p:strVal val="visible"/>
-                                      </p:to>
-                                    </p:set>
-                                  </p:childTnLst>
-                                </p:cTn>
-                              </p:par>
-                            </p:childTnLst>
-                          </p:cTn>
-                        </p:par>
-                      </p:childTnLst>
-                    </p:cTn>
-                  </p:par>
-                </p:childTnLst>
-              </p:cTn>
-              <p:prevCondLst>
-                <p:cond evt="onPrev" delay="0">
-                  <p:tgtEl>
-                    <p:sldTgt/>
-                  </p:tgtEl>
-                </p:cond>
-              </p:prevCondLst>
-              <p:nextCondLst>
-                <p:cond evt="onNext" delay="0">
-                  <p:tgtEl>
-                    <p:sldTgt/>
-                  </p:tgtEl>
-                </p:cond>
-              </p:nextCondLst>
-            </p:seq>
-          </p:childTnLst>
-        </p:cTn>
-      </p:par>
-    </p:tnLst>
-  </p:timing>
 </p:sld>
 </file>
 
@@ -6528,15 +6319,7 @@
             </a:r>
             <a:r>
               <a:rPr lang="en-US" dirty="0"/>
-              <a:t>, aesthetic mappings, </a:t>
-            </a:r>
-            <a:r>
-              <a:rPr lang="en-US" dirty="0" err="1"/>
-              <a:t>scale_s</a:t>
-            </a:r>
-            <a:r>
-              <a:rPr lang="en-US" dirty="0"/>
-              <a:t>, facets, and more</a:t>
+              <a:t>, aesthetic mappings, scales, facets, and more</a:t>
             </a:r>
           </a:p>
           <a:p>
@@ -6743,44 +6526,14 @@
           <a:p>
             <a:r>
               <a:rPr lang="en-US" dirty="0"/>
-              <a:t>Exercise on parametrized </a:t>
-            </a:r>
-            <a:r>
-              <a:rPr lang="en-US" dirty="0" err="1"/>
-              <a:t>RMarkdown</a:t>
-            </a:r>
+              <a:t>Two small exercises about visualization “do and don’t do”</a:t>
+            </a:r>
+          </a:p>
+          <a:p>
+            <a:pPr lvl="1"/>
             <a:r>
               <a:rPr lang="en-US" dirty="0"/>
-              <a:t> reports + Two small exercises about visualization “do and don’t do”</a:t>
-            </a:r>
-          </a:p>
-          <a:p>
-            <a:pPr lvl="1"/>
-            <a:r>
-              <a:rPr lang="en-US" dirty="0"/>
-              <a:t>02-Plotting.Rmd, exercise 1.5 + 2</a:t>
-            </a:r>
-          </a:p>
-          <a:p>
-            <a:r>
-              <a:rPr lang="en-US" dirty="0"/>
-              <a:t>A short note about interactivity of charts (</a:t>
-            </a:r>
-            <a:r>
-              <a:rPr lang="en-US" dirty="0" err="1"/>
-              <a:t>plotly</a:t>
-            </a:r>
-            <a:r>
-              <a:rPr lang="en-US" dirty="0"/>
-              <a:t>, </a:t>
-            </a:r>
-            <a:r>
-              <a:rPr lang="en-US" dirty="0" err="1"/>
-              <a:t>ggvis</a:t>
-            </a:r>
-            <a:r>
-              <a:rPr lang="en-US" dirty="0"/>
-              <a:t>)</a:t>
+              <a:t>02-Plotting.Rmd, exercise 2</a:t>
             </a:r>
           </a:p>
           <a:p>

</xml_diff>

<commit_message>
changed spread/gather into pivot_*
</commit_message>
<xml_diff>
--- a/presentations/pptx/03-Using tidyverse.pptx
+++ b/presentations/pptx/03-Using tidyverse.pptx
@@ -220,7 +220,7 @@
           <a:p>
             <a:fld id="{5C93CA8F-50F8-44B5-B48F-4C4452AC4FCB}" type="datetimeFigureOut">
               <a:rPr lang="he-IL" smtClean="0"/>
-              <a:t>ב'/אייר/תשע"ט</a:t>
+              <a:t>י"א/כסלו/תש"פ</a:t>
             </a:fld>
             <a:endParaRPr lang="he-IL"/>
           </a:p>
@@ -893,7 +893,7 @@
           <a:p>
             <a:fld id="{808B8BE7-FA93-462E-91E9-54E26C408D98}" type="datetime6">
               <a:rPr lang="en-US" smtClean="0"/>
-              <a:t>May 19</a:t>
+              <a:t>December 19</a:t>
             </a:fld>
             <a:endParaRPr lang="en-US" dirty="0"/>
           </a:p>
@@ -1126,7 +1126,7 @@
           <a:p>
             <a:fld id="{0D82CCDA-FC2D-4BA5-90E3-739DC6ED4C30}" type="datetime6">
               <a:rPr lang="en-US" smtClean="0"/>
-              <a:t>May 19</a:t>
+              <a:t>December 19</a:t>
             </a:fld>
             <a:endParaRPr lang="en-US" dirty="0"/>
           </a:p>
@@ -1305,7 +1305,7 @@
           <a:p>
             <a:fld id="{8F88DA83-5073-4626-B6B8-E91A24F45A53}" type="datetime6">
               <a:rPr lang="en-US" smtClean="0"/>
-              <a:t>May 19</a:t>
+              <a:t>December 19</a:t>
             </a:fld>
             <a:endParaRPr lang="en-US" dirty="0"/>
           </a:p>
@@ -1474,7 +1474,7 @@
           <a:p>
             <a:fld id="{EEBDCC4F-2BAB-4EBD-BBEA-01B8D436681A}" type="datetime6">
               <a:rPr lang="en-US" smtClean="0"/>
-              <a:t>May 19</a:t>
+              <a:t>December 19</a:t>
             </a:fld>
             <a:endParaRPr lang="en-US" dirty="0"/>
           </a:p>
@@ -1798,7 +1798,7 @@
           <a:p>
             <a:fld id="{79487F88-0456-4CDE-8B89-4A78647F618A}" type="datetime6">
               <a:rPr lang="en-US" smtClean="0"/>
-              <a:t>May 19</a:t>
+              <a:t>December 19</a:t>
             </a:fld>
             <a:endParaRPr lang="en-US" dirty="0"/>
           </a:p>
@@ -2248,7 +2248,7 @@
           <a:p>
             <a:fld id="{9136D32D-E4FB-4AA6-8422-EE667E33FFC1}" type="datetime6">
               <a:rPr lang="en-US" smtClean="0"/>
-              <a:t>May 19</a:t>
+              <a:t>December 19</a:t>
             </a:fld>
             <a:endParaRPr lang="en-US" dirty="0"/>
           </a:p>
@@ -2681,7 +2681,7 @@
           <a:p>
             <a:fld id="{3AB3EC8A-F822-46B6-826B-CC266009A74B}" type="datetime6">
               <a:rPr lang="en-US" smtClean="0"/>
-              <a:t>May 19</a:t>
+              <a:t>December 19</a:t>
             </a:fld>
             <a:endParaRPr lang="en-US" dirty="0"/>
           </a:p>
@@ -2798,7 +2798,7 @@
           <a:p>
             <a:fld id="{514A54EB-9E75-485B-93FC-08837C33F6A9}" type="datetime6">
               <a:rPr lang="en-US" smtClean="0"/>
-              <a:t>May 19</a:t>
+              <a:t>December 19</a:t>
             </a:fld>
             <a:endParaRPr lang="en-US" dirty="0"/>
           </a:p>
@@ -2892,7 +2892,7 @@
           <a:p>
             <a:fld id="{4187F57E-3EB2-4425-B7C6-E80F41215C16}" type="datetime6">
               <a:rPr lang="en-US" smtClean="0"/>
-              <a:t>May 19</a:t>
+              <a:t>December 19</a:t>
             </a:fld>
             <a:endParaRPr lang="en-US" dirty="0"/>
           </a:p>
@@ -3241,7 +3241,7 @@
           <a:p>
             <a:fld id="{C0AA945B-18EE-4367-BA0C-8D19048BCABE}" type="datetime6">
               <a:rPr lang="en-US" smtClean="0"/>
-              <a:t>May 19</a:t>
+              <a:t>December 19</a:t>
             </a:fld>
             <a:endParaRPr lang="en-US" dirty="0"/>
           </a:p>
@@ -3729,7 +3729,7 @@
           <a:p>
             <a:fld id="{F5D71FBB-8CD4-4D0A-B8C4-65C60609C705}" type="datetime6">
               <a:rPr lang="en-US" smtClean="0"/>
-              <a:t>May 19</a:t>
+              <a:t>December 19</a:t>
             </a:fld>
             <a:endParaRPr lang="en-US" dirty="0"/>
           </a:p>
@@ -4061,7 +4061,7 @@
           <a:p>
             <a:fld id="{CB7DA022-A739-4269-87CF-EB9B0BE787C4}" type="datetime6">
               <a:rPr lang="en-US" smtClean="0"/>
-              <a:t>May 19</a:t>
+              <a:t>December 19</a:t>
             </a:fld>
             <a:endParaRPr lang="en-US" dirty="0"/>
           </a:p>
@@ -8427,14 +8427,19 @@
             <p:ph idx="1"/>
           </p:nvPr>
         </p:nvSpPr>
-        <p:spPr/>
+        <p:spPr>
+          <a:xfrm>
+            <a:off x="550506" y="2121408"/>
+            <a:ext cx="10842172" cy="4050792"/>
+          </a:xfrm>
+        </p:spPr>
         <p:txBody>
           <a:bodyPr/>
           <a:lstStyle/>
           <a:p>
             <a:r>
-              <a:rPr lang="en-US" i="1" dirty="0"/>
-              <a:t>gather</a:t>
+              <a:rPr lang="en-US" i="1" dirty="0" err="1"/>
+              <a:t>pivot_longer</a:t>
             </a:r>
             <a:r>
               <a:rPr lang="en-US" dirty="0"/>
@@ -8442,7 +8447,7 @@
             </a:r>
             <a:r>
               <a:rPr lang="en-US" b="1" dirty="0"/>
-              <a:t>gathers</a:t>
+              <a:t>lengthens</a:t>
             </a:r>
             <a:r>
               <a:rPr lang="en-US" dirty="0"/>
@@ -8458,8 +8463,8 @@
           </a:p>
           <a:p>
             <a:r>
-              <a:rPr lang="en-US" i="1" dirty="0"/>
-              <a:t>spread</a:t>
+              <a:rPr lang="en-US" i="1" dirty="0" err="1"/>
+              <a:t>pivot_wider</a:t>
             </a:r>
             <a:r>
               <a:rPr lang="en-US" dirty="0"/>
@@ -8467,7 +8472,7 @@
             </a:r>
             <a:r>
               <a:rPr lang="en-US" b="1" dirty="0"/>
-              <a:t>spreads</a:t>
+              <a:t>widens</a:t>
             </a:r>
             <a:r>
               <a:rPr lang="en-US" dirty="0"/>
@@ -8531,58 +8536,6 @@
               <a:t>6</a:t>
             </a:fld>
             <a:endParaRPr lang="en-US" dirty="0"/>
-          </a:p>
-        </p:txBody>
-      </p:sp>
-      <p:sp>
-        <p:nvSpPr>
-          <p:cNvPr id="6" name="TextBox 5">
-            <a:extLst>
-              <a:ext uri="{FF2B5EF4-FFF2-40B4-BE49-F238E27FC236}">
-                <a16:creationId xmlns:a16="http://schemas.microsoft.com/office/drawing/2014/main" id="{69E5D5D5-BBE1-45F9-8665-C436917228AE}"/>
-              </a:ext>
-            </a:extLst>
-          </p:cNvPr>
-          <p:cNvSpPr txBox="1"/>
-          <p:nvPr/>
-        </p:nvSpPr>
-        <p:spPr>
-          <a:xfrm>
-            <a:off x="355244" y="5648980"/>
-            <a:ext cx="10955884" cy="523220"/>
-          </a:xfrm>
-          <a:prstGeom prst="rect">
-            <a:avLst/>
-          </a:prstGeom>
-          <a:noFill/>
-        </p:spPr>
-        <p:txBody>
-          <a:bodyPr wrap="square" rtlCol="0">
-            <a:spAutoFit/>
-          </a:bodyPr>
-          <a:lstStyle/>
-          <a:p>
-            <a:r>
-              <a:rPr lang="en-US" sz="1400" dirty="0"/>
-              <a:t>* The two functions are bound to be improved in the near future (with </a:t>
-            </a:r>
-            <a:r>
-              <a:rPr lang="en-US" sz="1400" i="1" dirty="0" err="1"/>
-              <a:t>pivot_wide</a:t>
-            </a:r>
-            <a:r>
-              <a:rPr lang="en-US" sz="1400" i="1" dirty="0"/>
-              <a:t>/</a:t>
-            </a:r>
-            <a:r>
-              <a:rPr lang="en-US" sz="1400" i="1" dirty="0" err="1"/>
-              <a:t>pivot_long</a:t>
-            </a:r>
-            <a:r>
-              <a:rPr lang="en-US" sz="1400" dirty="0"/>
-              <a:t> which are still in the development version), but for now spread and gather are still “the gold standard”</a:t>
-            </a:r>
-            <a:endParaRPr lang="en-IL" sz="1400" dirty="0"/>
           </a:p>
         </p:txBody>
       </p:sp>
@@ -8601,13 +8554,13 @@
           <p:nvPr>
             <p:extLst>
               <p:ext uri="{D42A27DB-BD31-4B8C-83A1-F6EECF244321}">
-                <p14:modId xmlns:p14="http://schemas.microsoft.com/office/powerpoint/2010/main" val="2706320759"/>
+                <p14:modId xmlns:p14="http://schemas.microsoft.com/office/powerpoint/2010/main" val="639509789"/>
               </p:ext>
             </p:extLst>
           </p:nvPr>
         </p:nvGraphicFramePr>
         <p:xfrm>
-          <a:off x="1335312" y="4116866"/>
+          <a:off x="2203059" y="4462099"/>
           <a:ext cx="2975430" cy="1295400"/>
         </p:xfrm>
         <a:graphic>
@@ -9046,13 +8999,13 @@
           <p:nvPr>
             <p:extLst>
               <p:ext uri="{D42A27DB-BD31-4B8C-83A1-F6EECF244321}">
-                <p14:modId xmlns:p14="http://schemas.microsoft.com/office/powerpoint/2010/main" val="219763329"/>
+                <p14:modId xmlns:p14="http://schemas.microsoft.com/office/powerpoint/2010/main" val="418124940"/>
               </p:ext>
             </p:extLst>
           </p:nvPr>
         </p:nvGraphicFramePr>
         <p:xfrm>
-          <a:off x="6096001" y="3339626"/>
+          <a:off x="6963748" y="3684859"/>
           <a:ext cx="1989906" cy="2072640"/>
         </p:xfrm>
         <a:graphic>
@@ -9518,7 +9471,7 @@
         </p:nvSpPr>
         <p:spPr>
           <a:xfrm>
-            <a:off x="4310743" y="3370217"/>
+            <a:off x="5178490" y="3715450"/>
             <a:ext cx="1672046" cy="718457"/>
           </a:xfrm>
           <a:custGeom>
@@ -9609,8 +9562,8 @@
         </p:nvSpPr>
         <p:spPr>
           <a:xfrm>
-            <a:off x="4668132" y="3584968"/>
-            <a:ext cx="906017" cy="369332"/>
+            <a:off x="5461231" y="3930201"/>
+            <a:ext cx="1510350" cy="369332"/>
           </a:xfrm>
           <a:prstGeom prst="rect">
             <a:avLst/>
@@ -9624,8 +9577,8 @@
           <a:lstStyle/>
           <a:p>
             <a:r>
-              <a:rPr lang="en-US" i="1" dirty="0"/>
-              <a:t>gather</a:t>
+              <a:rPr lang="en-US" i="1" dirty="0" err="1"/>
+              <a:t>pivot_longer</a:t>
             </a:r>
             <a:endParaRPr lang="en-IL" i="1" dirty="0"/>
           </a:p>
@@ -9645,7 +9598,7 @@
         </p:nvSpPr>
         <p:spPr>
           <a:xfrm>
-            <a:off x="4402183" y="4741817"/>
+            <a:off x="5269930" y="5087050"/>
             <a:ext cx="1593668" cy="653143"/>
           </a:xfrm>
           <a:custGeom>
@@ -9736,8 +9689,8 @@
         </p:nvSpPr>
         <p:spPr>
           <a:xfrm>
-            <a:off x="4668132" y="4741817"/>
-            <a:ext cx="955711" cy="369332"/>
+            <a:off x="5339187" y="4902384"/>
+            <a:ext cx="1463862" cy="369332"/>
           </a:xfrm>
           <a:prstGeom prst="rect">
             <a:avLst/>
@@ -9751,8 +9704,8 @@
           <a:lstStyle/>
           <a:p>
             <a:r>
-              <a:rPr lang="en-US" i="1" dirty="0"/>
-              <a:t>spread</a:t>
+              <a:rPr lang="en-US" i="1" dirty="0" err="1"/>
+              <a:t>pivot_wider</a:t>
             </a:r>
             <a:endParaRPr lang="en-IL" i="1" dirty="0"/>
           </a:p>
@@ -10390,11 +10343,11 @@
             </a:br>
             <a:r>
               <a:rPr lang="en-US" dirty="0"/>
-              <a:t>“03-Example for spread </a:t>
+              <a:t>“03-Example for </a:t>
             </a:r>
             <a:r>
               <a:rPr lang="en-US" dirty="0" err="1"/>
-              <a:t>gather.R</a:t>
+              <a:t>pivot.R</a:t>
             </a:r>
             <a:r>
               <a:rPr lang="en-US" dirty="0"/>
@@ -10407,8 +10360,8 @@
               <a:t>Read the documentation of </a:t>
             </a:r>
             <a:r>
-              <a:rPr lang="en-US" i="1" dirty="0"/>
-              <a:t>gather</a:t>
+              <a:rPr lang="en-US" i="1" dirty="0" err="1"/>
+              <a:t>pivot_longer</a:t>
             </a:r>
             <a:r>
               <a:rPr lang="en-US" dirty="0"/>
@@ -10491,7 +10444,7 @@
         <p:spPr>
           <a:xfrm>
             <a:off x="1239665" y="3613865"/>
-            <a:ext cx="4740400" cy="2123658"/>
+            <a:ext cx="6320961" cy="2123658"/>
           </a:xfrm>
           <a:prstGeom prst="rect">
             <a:avLst/>
@@ -10654,7 +10607,7 @@
                 <a:latin typeface="Courier New" panose="02070309020205020404" pitchFamily="49" charset="0"/>
                 <a:cs typeface="Courier New" panose="02070309020205020404" pitchFamily="49" charset="0"/>
               </a:rPr>
-              <a:t> %&gt;%</a:t>
+              <a:t> %&gt;% </a:t>
             </a:r>
           </a:p>
           <a:p>
@@ -10663,21 +10616,49 @@
                 <a:latin typeface="Courier New" panose="02070309020205020404" pitchFamily="49" charset="0"/>
                 <a:cs typeface="Courier New" panose="02070309020205020404" pitchFamily="49" charset="0"/>
               </a:rPr>
-              <a:t>   gather(key = "day", value = "</a:t>
+              <a:t>  </a:t>
             </a:r>
             <a:r>
               <a:rPr lang="en-US" sz="1200" dirty="0" err="1">
                 <a:latin typeface="Courier New" panose="02070309020205020404" pitchFamily="49" charset="0"/>
                 <a:cs typeface="Courier New" panose="02070309020205020404" pitchFamily="49" charset="0"/>
               </a:rPr>
-              <a:t>frauds_detected</a:t>
+              <a:t>pivot_longer</a:t>
             </a:r>
             <a:r>
               <a:rPr lang="en-US" sz="1200" dirty="0">
                 <a:latin typeface="Courier New" panose="02070309020205020404" pitchFamily="49" charset="0"/>
                 <a:cs typeface="Courier New" panose="02070309020205020404" pitchFamily="49" charset="0"/>
               </a:rPr>
-              <a:t>")</a:t>
+              <a:t>(cols = day1, </a:t>
+            </a:r>
+            <a:r>
+              <a:rPr lang="en-US" sz="1200" dirty="0" err="1">
+                <a:latin typeface="Courier New" panose="02070309020205020404" pitchFamily="49" charset="0"/>
+                <a:cs typeface="Courier New" panose="02070309020205020404" pitchFamily="49" charset="0"/>
+              </a:rPr>
+              <a:t>names_to</a:t>
+            </a:r>
+            <a:r>
+              <a:rPr lang="en-US" sz="1200" dirty="0">
+                <a:latin typeface="Courier New" panose="02070309020205020404" pitchFamily="49" charset="0"/>
+                <a:cs typeface="Courier New" panose="02070309020205020404" pitchFamily="49" charset="0"/>
+              </a:rPr>
+              <a:t> = "day", </a:t>
+            </a:r>
+            <a:r>
+              <a:rPr lang="en-US" sz="1200" dirty="0" err="1">
+                <a:latin typeface="Courier New" panose="02070309020205020404" pitchFamily="49" charset="0"/>
+                <a:cs typeface="Courier New" panose="02070309020205020404" pitchFamily="49" charset="0"/>
+              </a:rPr>
+              <a:t>values_to</a:t>
+            </a:r>
+            <a:r>
+              <a:rPr lang="en-US" sz="1200" dirty="0">
+                <a:latin typeface="Courier New" panose="02070309020205020404" pitchFamily="49" charset="0"/>
+                <a:cs typeface="Courier New" panose="02070309020205020404" pitchFamily="49" charset="0"/>
+              </a:rPr>
+              <a:t> = "sales")</a:t>
             </a:r>
             <a:endParaRPr lang="en-IL" sz="1200" dirty="0">
               <a:latin typeface="Courier New" panose="02070309020205020404" pitchFamily="49" charset="0"/>
@@ -11403,8 +11384,8 @@
               <a:t>In pairs: bring this long format back into a wide format, using </a:t>
             </a:r>
             <a:r>
-              <a:rPr lang="en-US" i="1" dirty="0"/>
-              <a:t>spread</a:t>
+              <a:rPr lang="en-US" i="1" dirty="0" err="1"/>
+              <a:t>pivot_wider</a:t>
             </a:r>
             <a:endParaRPr lang="en-US" dirty="0"/>
           </a:p>
@@ -11419,11 +11400,11 @@
             </a:br>
             <a:r>
               <a:rPr lang="en-US" dirty="0"/>
-              <a:t>“03-Example for spread </a:t>
+              <a:t>“03-Example for </a:t>
             </a:r>
             <a:r>
               <a:rPr lang="en-US" dirty="0" err="1"/>
-              <a:t>gather.R</a:t>
+              <a:t>pivot.R</a:t>
             </a:r>
             <a:r>
               <a:rPr lang="en-US" dirty="0"/>
@@ -11693,7 +11674,21 @@
                 <a:latin typeface="Courier New" panose="02070309020205020404" pitchFamily="49" charset="0"/>
                 <a:cs typeface="Courier New" panose="02070309020205020404" pitchFamily="49" charset="0"/>
               </a:rPr>
-              <a:t>   spread(???)</a:t>
+              <a:t>   </a:t>
+            </a:r>
+            <a:r>
+              <a:rPr lang="en-US" sz="1200" dirty="0" err="1">
+                <a:latin typeface="Courier New" panose="02070309020205020404" pitchFamily="49" charset="0"/>
+                <a:cs typeface="Courier New" panose="02070309020205020404" pitchFamily="49" charset="0"/>
+              </a:rPr>
+              <a:t>pivot_wider</a:t>
+            </a:r>
+            <a:r>
+              <a:rPr lang="en-US" sz="1200" dirty="0">
+                <a:latin typeface="Courier New" panose="02070309020205020404" pitchFamily="49" charset="0"/>
+                <a:cs typeface="Courier New" panose="02070309020205020404" pitchFamily="49" charset="0"/>
+              </a:rPr>
+              <a:t>(???)</a:t>
             </a:r>
             <a:endParaRPr lang="en-IL" sz="1200" dirty="0">
               <a:latin typeface="Courier New" panose="02070309020205020404" pitchFamily="49" charset="0"/>

</xml_diff>